<commit_message>
added one bullet to future work on presentation
</commit_message>
<xml_diff>
--- a/research_project/ProjectPresentation.pptx
+++ b/research_project/ProjectPresentation.pptx
@@ -710,7 +710,7 @@
             <a:fld id="{8E40C9BC-F2F8-4E3F-9EB6-F2BB984BE1AB}" type="datetimeFigureOut">
               <a:rPr lang="en-US" smtClean="0"/>
               <a:pPr/>
-              <a:t>12/1/2013</a:t>
+              <a:t>12/2/2013</a:t>
             </a:fld>
             <a:endParaRPr lang="en-US"/>
           </a:p>
@@ -2645,11 +2645,7 @@
           <a:p>
             <a:r>
               <a:rPr lang="en-US" dirty="0" smtClean="0"/>
-              <a:t>Project </a:t>
-            </a:r>
-            <a:r>
-              <a:rPr lang="en-US" dirty="0" smtClean="0"/>
-              <a:t>Architecture</a:t>
+              <a:t>Project Architecture</a:t>
             </a:r>
             <a:endParaRPr lang="en-US" dirty="0"/>
           </a:p>
@@ -2680,11 +2676,7 @@
           <a:p>
             <a:r>
               <a:rPr lang="en-US" dirty="0" smtClean="0"/>
-              <a:t>Published data </a:t>
-            </a:r>
-            <a:r>
-              <a:rPr lang="en-US" dirty="0" smtClean="0"/>
-              <a:t>stored in pub database</a:t>
+              <a:t>Published data stored in pub database</a:t>
             </a:r>
           </a:p>
           <a:p>
@@ -4348,22 +4340,7 @@
                   <a:ea typeface="Calibri" pitchFamily="34" charset="0"/>
                   <a:cs typeface="Times New Roman" pitchFamily="18" charset="0"/>
                 </a:rPr>
-                <a:t>( X M L </a:t>
-              </a:r>
-              <a:r>
-                <a:rPr kumimoji="0" lang="en-US" sz="1100" b="0" i="0" u="none" strike="noStrike" cap="none" normalizeH="0" baseline="0" dirty="0" smtClean="0">
-                  <a:ln>
-                    <a:noFill/>
-                  </a:ln>
-                  <a:solidFill>
-                    <a:schemeClr val="tx1"/>
-                  </a:solidFill>
-                  <a:effectLst/>
-                  <a:latin typeface="Calibri" pitchFamily="34" charset="0"/>
-                  <a:ea typeface="Calibri" pitchFamily="34" charset="0"/>
-                  <a:cs typeface="Times New Roman" pitchFamily="18" charset="0"/>
-                </a:rPr>
-                <a:t>)</a:t>
+                <a:t>( X M L )</a:t>
               </a:r>
             </a:p>
             <a:p>
@@ -5070,7 +5047,7 @@
         <p:spPr/>
         <p:txBody>
           <a:bodyPr>
-            <a:normAutofit fontScale="92500" lnSpcReduction="20000"/>
+            <a:normAutofit fontScale="85000" lnSpcReduction="20000"/>
           </a:bodyPr>
           <a:lstStyle/>
           <a:p>
@@ -5078,7 +5055,6 @@
               <a:rPr lang="en-US" dirty="0" smtClean="0"/>
               <a:t>Encrypt databases and all data transmitted over web</a:t>
             </a:r>
-            <a:endParaRPr lang="en-US" dirty="0" smtClean="0"/>
           </a:p>
           <a:p>
             <a:r>
@@ -5113,7 +5089,17 @@
             </a:r>
             <a:r>
               <a:rPr lang="en-US" dirty="0" smtClean="0"/>
-              <a:t>) not just text values</a:t>
+              <a:t>) not just text </a:t>
+            </a:r>
+            <a:r>
+              <a:rPr lang="en-US" dirty="0" smtClean="0"/>
+              <a:t>values</a:t>
+            </a:r>
+          </a:p>
+          <a:p>
+            <a:r>
+              <a:rPr lang="en-US" dirty="0" smtClean="0"/>
+              <a:t>Allow users to browse and upload an existing file</a:t>
             </a:r>
             <a:endParaRPr lang="en-US" dirty="0"/>
           </a:p>
@@ -5284,11 +5270,7 @@
           <a:p>
             <a:r>
               <a:rPr lang="en-US" dirty="0" smtClean="0"/>
-              <a:t>Presentation </a:t>
-            </a:r>
-            <a:r>
-              <a:rPr lang="en-US" dirty="0" smtClean="0"/>
-              <a:t>Overview</a:t>
+              <a:t>Presentation Overview</a:t>
             </a:r>
             <a:endParaRPr lang="en-US" dirty="0"/>
           </a:p>
@@ -5360,7 +5342,6 @@
               <a:rPr lang="en-US" dirty="0" smtClean="0"/>
               <a:t>Future Work</a:t>
             </a:r>
-            <a:endParaRPr lang="en-US" dirty="0" smtClean="0"/>
           </a:p>
         </p:txBody>
       </p:sp>
@@ -5440,7 +5421,6 @@
               <a:rPr lang="en-US" dirty="0" smtClean="0"/>
               <a:t>XML in and of itself is not secure</a:t>
             </a:r>
-            <a:endParaRPr lang="en-US" dirty="0" smtClean="0"/>
           </a:p>
           <a:p>
             <a:pPr marL="0" indent="0">
@@ -5477,7 +5457,6 @@
               <a:rPr lang="en-US" dirty="0" smtClean="0"/>
               <a:t>Users need to be able to share this data securely</a:t>
             </a:r>
-            <a:endParaRPr lang="en-US" dirty="0" smtClean="0"/>
           </a:p>
         </p:txBody>
       </p:sp>
@@ -5562,7 +5541,6 @@
               <a:rPr lang="en-US" dirty="0" smtClean="0"/>
               <a:t>An out of state driver is speeding and causes an accident</a:t>
             </a:r>
-            <a:endParaRPr lang="en-US" dirty="0" smtClean="0"/>
           </a:p>
           <a:p>
             <a:r>
@@ -5583,7 +5561,6 @@
               <a:rPr lang="en-US" dirty="0" smtClean="0"/>
               <a:t>tate Police</a:t>
             </a:r>
-            <a:endParaRPr lang="en-US" dirty="0" smtClean="0"/>
           </a:p>
           <a:p>
             <a:r>
@@ -5692,7 +5669,6 @@
               <a:rPr lang="en-US" dirty="0" smtClean="0"/>
               <a:t>Agencies need to share information regarding the driver</a:t>
             </a:r>
-            <a:endParaRPr lang="en-US" dirty="0" smtClean="0"/>
           </a:p>
           <a:p>
             <a:r>
@@ -5705,7 +5681,6 @@
               <a:rPr lang="en-US" dirty="0" smtClean="0"/>
               <a:t>Agencies do not need full access to all data on driver (insurance needs medical records from doctor, but only regarding accident)</a:t>
             </a:r>
-            <a:endParaRPr lang="en-US" dirty="0" smtClean="0"/>
           </a:p>
           <a:p>
             <a:r>
@@ -5820,7 +5795,6 @@
               <a:rPr lang="en-US" dirty="0" smtClean="0"/>
               <a:t>Keys sometimes provided directly to the subscriber</a:t>
             </a:r>
-            <a:endParaRPr lang="en-US" dirty="0" smtClean="0"/>
           </a:p>
           <a:p>
             <a:r>
@@ -5839,7 +5813,6 @@
               <a:rPr lang="en-US" dirty="0" smtClean="0"/>
               <a:t>Some allow third party publishing and still ensure security</a:t>
             </a:r>
-            <a:endParaRPr lang="en-US" dirty="0" smtClean="0"/>
           </a:p>
         </p:txBody>
       </p:sp>
@@ -5949,7 +5922,6 @@
               <a:rPr lang="en-US" dirty="0" smtClean="0"/>
               <a:t>Use new technique for updates and access levels (XPATH)</a:t>
             </a:r>
-            <a:endParaRPr lang="en-US" dirty="0" smtClean="0"/>
           </a:p>
         </p:txBody>
       </p:sp>
@@ -6032,13 +6004,8 @@
           <a:p>
             <a:r>
               <a:rPr lang="en-US" dirty="0" smtClean="0"/>
-              <a:t>Secure XML publisher / subscriber </a:t>
-            </a:r>
-            <a:r>
-              <a:rPr lang="en-US" dirty="0" smtClean="0"/>
-              <a:t>model implemented in Python</a:t>
-            </a:r>
-            <a:endParaRPr lang="en-US" dirty="0" smtClean="0"/>
+              <a:t>Secure XML publisher / subscriber model implemented in Python</a:t>
+            </a:r>
           </a:p>
           <a:p>
             <a:pPr lvl="1"/>
@@ -6051,11 +6018,7 @@
             <a:pPr lvl="1"/>
             <a:r>
               <a:rPr lang="en-US" dirty="0" smtClean="0"/>
-              <a:t>XML is also secured at the document </a:t>
-            </a:r>
-            <a:r>
-              <a:rPr lang="en-US" dirty="0" smtClean="0"/>
-              <a:t>level</a:t>
+              <a:t>XML is also secured at the document level</a:t>
             </a:r>
           </a:p>
           <a:p>
@@ -6064,7 +6027,6 @@
               <a:rPr lang="en-US" dirty="0" smtClean="0"/>
               <a:t>XPATH specifies access level</a:t>
             </a:r>
-            <a:endParaRPr lang="en-US" dirty="0" smtClean="0"/>
           </a:p>
           <a:p>
             <a:pPr lvl="1">
@@ -6072,11 +6034,7 @@
             </a:pPr>
             <a:r>
               <a:rPr lang="en-US" dirty="0" smtClean="0"/>
-              <a:t>	(Future: also at the XML tag / element level</a:t>
-            </a:r>
-            <a:r>
-              <a:rPr lang="en-US" dirty="0" smtClean="0"/>
-              <a:t>)</a:t>
+              <a:t>	(Future: also at the XML tag / element level)</a:t>
             </a:r>
           </a:p>
           <a:p>
@@ -6166,11 +6124,7 @@
           <a:p>
             <a:r>
               <a:rPr lang="en-US" dirty="0" smtClean="0"/>
-              <a:t>Partial </a:t>
-            </a:r>
-            <a:r>
-              <a:rPr lang="en-US" dirty="0" smtClean="0"/>
-              <a:t>XML document update</a:t>
+              <a:t>Partial XML document update</a:t>
             </a:r>
           </a:p>
           <a:p>
@@ -6190,13 +6144,8 @@
             <a:pPr lvl="1"/>
             <a:r>
               <a:rPr lang="en-US" dirty="0" smtClean="0"/>
-              <a:t>XPATH </a:t>
-            </a:r>
-            <a:r>
-              <a:rPr lang="en-US" dirty="0" smtClean="0"/>
-              <a:t>is used to specify which portion(s) to update</a:t>
-            </a:r>
-            <a:endParaRPr lang="en-US" dirty="0" smtClean="0"/>
+              <a:t>XPATH is used to specify which portion(s) to update</a:t>
+            </a:r>
           </a:p>
           <a:p>
             <a:pPr lvl="1"/>

</xml_diff>